<commit_message>
- LSIS 옴론 PLC 변환기   * Test ladder graph builder
</commit_message>
<xml_diff>
--- a/Documents/직접변환불가case.pptx
+++ b/Documents/직접변환불가case.pptx
@@ -5,12 +5,13 @@
     <p:sldMasterId id="2147483648" r:id="rId1"/>
   </p:sldMasterIdLst>
   <p:notesMasterIdLst>
-    <p:notesMasterId r:id="rId5"/>
+    <p:notesMasterId r:id="rId6"/>
   </p:notesMasterIdLst>
   <p:sldIdLst>
     <p:sldId id="256" r:id="rId2"/>
     <p:sldId id="257" r:id="rId3"/>
     <p:sldId id="258" r:id="rId4"/>
+    <p:sldId id="259" r:id="rId5"/>
   </p:sldIdLst>
   <p:sldSz cx="12192000" cy="6858000"/>
   <p:notesSz cx="6858000" cy="9144000"/>
@@ -199,7 +200,7 @@
           <a:p>
             <a:fld id="{60D39D9F-76CB-4282-9F90-B24316253801}" type="datetimeFigureOut">
               <a:rPr lang="ko-KR" altLang="en-US" smtClean="0"/>
-              <a:t>2019-10-16</a:t>
+              <a:t>2019-10-19</a:t>
             </a:fld>
             <a:endParaRPr lang="ko-KR" altLang="en-US"/>
           </a:p>
@@ -888,7 +889,7 @@
           <a:p>
             <a:fld id="{C6F2F78B-48FB-46E5-9A54-3C3A9872A62A}" type="datetimeFigureOut">
               <a:rPr lang="ko-KR" altLang="en-US" smtClean="0"/>
-              <a:t>2019-10-16</a:t>
+              <a:t>2019-10-19</a:t>
             </a:fld>
             <a:endParaRPr lang="ko-KR" altLang="en-US"/>
           </a:p>
@@ -1086,7 +1087,7 @@
           <a:p>
             <a:fld id="{C6F2F78B-48FB-46E5-9A54-3C3A9872A62A}" type="datetimeFigureOut">
               <a:rPr lang="ko-KR" altLang="en-US" smtClean="0"/>
-              <a:t>2019-10-16</a:t>
+              <a:t>2019-10-19</a:t>
             </a:fld>
             <a:endParaRPr lang="ko-KR" altLang="en-US"/>
           </a:p>
@@ -1294,7 +1295,7 @@
           <a:p>
             <a:fld id="{C6F2F78B-48FB-46E5-9A54-3C3A9872A62A}" type="datetimeFigureOut">
               <a:rPr lang="ko-KR" altLang="en-US" smtClean="0"/>
-              <a:t>2019-10-16</a:t>
+              <a:t>2019-10-19</a:t>
             </a:fld>
             <a:endParaRPr lang="ko-KR" altLang="en-US"/>
           </a:p>
@@ -1492,7 +1493,7 @@
           <a:p>
             <a:fld id="{C6F2F78B-48FB-46E5-9A54-3C3A9872A62A}" type="datetimeFigureOut">
               <a:rPr lang="ko-KR" altLang="en-US" smtClean="0"/>
-              <a:t>2019-10-16</a:t>
+              <a:t>2019-10-19</a:t>
             </a:fld>
             <a:endParaRPr lang="ko-KR" altLang="en-US"/>
           </a:p>
@@ -1767,7 +1768,7 @@
           <a:p>
             <a:fld id="{C6F2F78B-48FB-46E5-9A54-3C3A9872A62A}" type="datetimeFigureOut">
               <a:rPr lang="ko-KR" altLang="en-US" smtClean="0"/>
-              <a:t>2019-10-16</a:t>
+              <a:t>2019-10-19</a:t>
             </a:fld>
             <a:endParaRPr lang="ko-KR" altLang="en-US"/>
           </a:p>
@@ -2032,7 +2033,7 @@
           <a:p>
             <a:fld id="{C6F2F78B-48FB-46E5-9A54-3C3A9872A62A}" type="datetimeFigureOut">
               <a:rPr lang="ko-KR" altLang="en-US" smtClean="0"/>
-              <a:t>2019-10-16</a:t>
+              <a:t>2019-10-19</a:t>
             </a:fld>
             <a:endParaRPr lang="ko-KR" altLang="en-US"/>
           </a:p>
@@ -2444,7 +2445,7 @@
           <a:p>
             <a:fld id="{C6F2F78B-48FB-46E5-9A54-3C3A9872A62A}" type="datetimeFigureOut">
               <a:rPr lang="ko-KR" altLang="en-US" smtClean="0"/>
-              <a:t>2019-10-16</a:t>
+              <a:t>2019-10-19</a:t>
             </a:fld>
             <a:endParaRPr lang="ko-KR" altLang="en-US"/>
           </a:p>
@@ -2585,7 +2586,7 @@
           <a:p>
             <a:fld id="{C6F2F78B-48FB-46E5-9A54-3C3A9872A62A}" type="datetimeFigureOut">
               <a:rPr lang="ko-KR" altLang="en-US" smtClean="0"/>
-              <a:t>2019-10-16</a:t>
+              <a:t>2019-10-19</a:t>
             </a:fld>
             <a:endParaRPr lang="ko-KR" altLang="en-US"/>
           </a:p>
@@ -2698,7 +2699,7 @@
           <a:p>
             <a:fld id="{C6F2F78B-48FB-46E5-9A54-3C3A9872A62A}" type="datetimeFigureOut">
               <a:rPr lang="ko-KR" altLang="en-US" smtClean="0"/>
-              <a:t>2019-10-16</a:t>
+              <a:t>2019-10-19</a:t>
             </a:fld>
             <a:endParaRPr lang="ko-KR" altLang="en-US"/>
           </a:p>
@@ -3009,7 +3010,7 @@
           <a:p>
             <a:fld id="{C6F2F78B-48FB-46E5-9A54-3C3A9872A62A}" type="datetimeFigureOut">
               <a:rPr lang="ko-KR" altLang="en-US" smtClean="0"/>
-              <a:t>2019-10-16</a:t>
+              <a:t>2019-10-19</a:t>
             </a:fld>
             <a:endParaRPr lang="ko-KR" altLang="en-US"/>
           </a:p>
@@ -3297,7 +3298,7 @@
           <a:p>
             <a:fld id="{C6F2F78B-48FB-46E5-9A54-3C3A9872A62A}" type="datetimeFigureOut">
               <a:rPr lang="ko-KR" altLang="en-US" smtClean="0"/>
-              <a:t>2019-10-16</a:t>
+              <a:t>2019-10-19</a:t>
             </a:fld>
             <a:endParaRPr lang="ko-KR" altLang="en-US"/>
           </a:p>
@@ -3538,7 +3539,7 @@
           <a:p>
             <a:fld id="{C6F2F78B-48FB-46E5-9A54-3C3A9872A62A}" type="datetimeFigureOut">
               <a:rPr lang="ko-KR" altLang="en-US" smtClean="0"/>
-              <a:t>2019-10-16</a:t>
+              <a:t>2019-10-19</a:t>
             </a:fld>
             <a:endParaRPr lang="ko-KR" altLang="en-US"/>
           </a:p>
@@ -4846,6 +4847,981 @@
     <p:extLst>
       <p:ext uri="{BB962C8B-B14F-4D97-AF65-F5344CB8AC3E}">
         <p14:creationId xmlns:p14="http://schemas.microsoft.com/office/powerpoint/2010/main" val="2426771736"/>
+      </p:ext>
+    </p:extLst>
+  </p:cSld>
+  <p:clrMapOvr>
+    <a:masterClrMapping/>
+  </p:clrMapOvr>
+</p:sld>
+</file>
+
+<file path=ppt/slides/slide4.xml><?xml version="1.0" encoding="utf-8"?>
+<p:sld xmlns:a="http://schemas.openxmlformats.org/drawingml/2006/main" xmlns:r="http://schemas.openxmlformats.org/officeDocument/2006/relationships" xmlns:p="http://schemas.openxmlformats.org/presentationml/2006/main">
+  <p:cSld>
+    <p:spTree>
+      <p:nvGrpSpPr>
+        <p:cNvPr id="1" name=""/>
+        <p:cNvGrpSpPr/>
+        <p:nvPr/>
+      </p:nvGrpSpPr>
+      <p:grpSpPr>
+        <a:xfrm>
+          <a:off x="0" y="0"/>
+          <a:ext cx="0" cy="0"/>
+          <a:chOff x="0" y="0"/>
+          <a:chExt cx="0" cy="0"/>
+        </a:xfrm>
+      </p:grpSpPr>
+      <p:sp>
+        <p:nvSpPr>
+          <p:cNvPr id="2" name="제목 1">
+            <a:extLst>
+              <a:ext uri="{FF2B5EF4-FFF2-40B4-BE49-F238E27FC236}">
+                <a16:creationId xmlns:a16="http://schemas.microsoft.com/office/drawing/2014/main" id="{A035F339-639B-4A8C-B44F-943BCF08A385}"/>
+              </a:ext>
+            </a:extLst>
+          </p:cNvPr>
+          <p:cNvSpPr>
+            <a:spLocks noGrp="1"/>
+          </p:cNvSpPr>
+          <p:nvPr>
+            <p:ph type="title"/>
+          </p:nvPr>
+        </p:nvSpPr>
+        <p:spPr/>
+        <p:txBody>
+          <a:bodyPr/>
+          <a:lstStyle/>
+          <a:p>
+            <a:r>
+              <a:rPr lang="en-US" altLang="ko-KR" dirty="0"/>
+              <a:t>CXP</a:t>
+            </a:r>
+            <a:r>
+              <a:rPr lang="ko-KR" altLang="en-US" dirty="0"/>
+              <a:t> </a:t>
+            </a:r>
+            <a:r>
+              <a:rPr lang="en-US" altLang="ko-KR" dirty="0"/>
+              <a:t>IL</a:t>
+            </a:r>
+            <a:r>
+              <a:rPr lang="ko-KR" altLang="en-US" dirty="0"/>
+              <a:t> </a:t>
+            </a:r>
+            <a:r>
+              <a:rPr lang="en-US" altLang="ko-KR" dirty="0"/>
+              <a:t>TR</a:t>
+            </a:r>
+            <a:r>
+              <a:rPr lang="ko-KR" altLang="en-US" dirty="0"/>
+              <a:t> </a:t>
+            </a:r>
+            <a:r>
+              <a:rPr lang="en-US" altLang="ko-KR" dirty="0"/>
+              <a:t>overwrite (</a:t>
+            </a:r>
+            <a:r>
+              <a:rPr lang="ko-KR" altLang="en-US" dirty="0"/>
+              <a:t>재사용</a:t>
+            </a:r>
+            <a:r>
+              <a:rPr lang="en-US" altLang="ko-KR" dirty="0"/>
+              <a:t>)</a:t>
+            </a:r>
+            <a:endParaRPr lang="ko-KR" altLang="en-US" dirty="0"/>
+          </a:p>
+        </p:txBody>
+      </p:sp>
+      <p:sp>
+        <p:nvSpPr>
+          <p:cNvPr id="6" name="TextBox 5">
+            <a:extLst>
+              <a:ext uri="{FF2B5EF4-FFF2-40B4-BE49-F238E27FC236}">
+                <a16:creationId xmlns:a16="http://schemas.microsoft.com/office/drawing/2014/main" id="{1681C2EB-C9F9-46C7-947B-BBE424A2A524}"/>
+              </a:ext>
+            </a:extLst>
+          </p:cNvPr>
+          <p:cNvSpPr txBox="1"/>
+          <p:nvPr/>
+        </p:nvSpPr>
+        <p:spPr>
+          <a:xfrm>
+            <a:off x="8516488" y="1787911"/>
+            <a:ext cx="950901" cy="2092881"/>
+          </a:xfrm>
+          <a:prstGeom prst="rect">
+            <a:avLst/>
+          </a:prstGeom>
+          <a:noFill/>
+        </p:spPr>
+        <p:txBody>
+          <a:bodyPr wrap="none" rtlCol="0">
+            <a:spAutoFit/>
+          </a:bodyPr>
+          <a:lstStyle/>
+          <a:p>
+            <a:r>
+              <a:rPr lang="en-US" altLang="ko-KR" sz="1000" dirty="0"/>
+              <a:t>LD P00000</a:t>
+            </a:r>
+          </a:p>
+          <a:p>
+            <a:r>
+              <a:rPr lang="en-US" altLang="ko-KR" sz="1000" b="1" dirty="0"/>
+              <a:t>OUT TR0</a:t>
+            </a:r>
+          </a:p>
+          <a:p>
+            <a:r>
+              <a:rPr lang="en-US" altLang="ko-KR" sz="1000" dirty="0"/>
+              <a:t>AND P00001</a:t>
+            </a:r>
+          </a:p>
+          <a:p>
+            <a:r>
+              <a:rPr lang="en-US" altLang="ko-KR" sz="1000" dirty="0"/>
+              <a:t>OUT P00100</a:t>
+            </a:r>
+          </a:p>
+          <a:p>
+            <a:r>
+              <a:rPr lang="en-US" altLang="ko-KR" sz="1000" dirty="0"/>
+              <a:t>LD TR0</a:t>
+            </a:r>
+          </a:p>
+          <a:p>
+            <a:r>
+              <a:rPr lang="en-US" altLang="ko-KR" sz="1000" dirty="0"/>
+              <a:t>AND P0000B</a:t>
+            </a:r>
+          </a:p>
+          <a:p>
+            <a:r>
+              <a:rPr lang="en-US" altLang="ko-KR" sz="1000" b="1" dirty="0"/>
+              <a:t>OUT TR0</a:t>
+            </a:r>
+          </a:p>
+          <a:p>
+            <a:r>
+              <a:rPr lang="en-US" altLang="ko-KR" sz="1000" dirty="0"/>
+              <a:t>AND P0000C</a:t>
+            </a:r>
+          </a:p>
+          <a:p>
+            <a:r>
+              <a:rPr lang="en-US" altLang="ko-KR" sz="1000" dirty="0"/>
+              <a:t>OUT P00105</a:t>
+            </a:r>
+          </a:p>
+          <a:p>
+            <a:r>
+              <a:rPr lang="en-US" altLang="ko-KR" sz="1000" dirty="0"/>
+              <a:t>LD TR0</a:t>
+            </a:r>
+          </a:p>
+          <a:p>
+            <a:r>
+              <a:rPr lang="en-US" altLang="ko-KR" sz="1000" dirty="0"/>
+              <a:t>AND P0000D</a:t>
+            </a:r>
+          </a:p>
+          <a:p>
+            <a:r>
+              <a:rPr lang="en-US" altLang="ko-KR" sz="1000" dirty="0"/>
+              <a:t>OUT P00106</a:t>
+            </a:r>
+          </a:p>
+          <a:p>
+            <a:endParaRPr lang="ko-KR" altLang="en-US" sz="1000" dirty="0"/>
+          </a:p>
+        </p:txBody>
+      </p:sp>
+      <p:pic>
+        <p:nvPicPr>
+          <p:cNvPr id="7" name="그림 6">
+            <a:extLst>
+              <a:ext uri="{FF2B5EF4-FFF2-40B4-BE49-F238E27FC236}">
+                <a16:creationId xmlns:a16="http://schemas.microsoft.com/office/drawing/2014/main" id="{A19FD7CD-9AD0-4AD3-97ED-3E1537571CC4}"/>
+              </a:ext>
+            </a:extLst>
+          </p:cNvPr>
+          <p:cNvPicPr>
+            <a:picLocks noChangeAspect="1"/>
+          </p:cNvPicPr>
+          <p:nvPr/>
+        </p:nvPicPr>
+        <p:blipFill>
+          <a:blip r:embed="rId2"/>
+          <a:stretch>
+            <a:fillRect/>
+          </a:stretch>
+        </p:blipFill>
+        <p:spPr>
+          <a:xfrm>
+            <a:off x="823913" y="2471738"/>
+            <a:ext cx="6858642" cy="1245336"/>
+          </a:xfrm>
+          <a:prstGeom prst="rect">
+            <a:avLst/>
+          </a:prstGeom>
+        </p:spPr>
+      </p:pic>
+      <p:sp>
+        <p:nvSpPr>
+          <p:cNvPr id="8" name="직사각형 7">
+            <a:extLst>
+              <a:ext uri="{FF2B5EF4-FFF2-40B4-BE49-F238E27FC236}">
+                <a16:creationId xmlns:a16="http://schemas.microsoft.com/office/drawing/2014/main" id="{12F6D494-4737-4473-AB71-6E342FDF806F}"/>
+              </a:ext>
+            </a:extLst>
+          </p:cNvPr>
+          <p:cNvSpPr/>
+          <p:nvPr/>
+        </p:nvSpPr>
+        <p:spPr>
+          <a:xfrm>
+            <a:off x="1797605" y="2634306"/>
+            <a:ext cx="180242" cy="248641"/>
+          </a:xfrm>
+          <a:prstGeom prst="rect">
+            <a:avLst/>
+          </a:prstGeom>
+          <a:noFill/>
+          <a:ln>
+            <a:solidFill>
+              <a:srgbClr val="FF0000"/>
+            </a:solidFill>
+          </a:ln>
+        </p:spPr>
+        <p:style>
+          <a:lnRef idx="2">
+            <a:schemeClr val="accent1">
+              <a:shade val="50000"/>
+            </a:schemeClr>
+          </a:lnRef>
+          <a:fillRef idx="1">
+            <a:schemeClr val="accent1"/>
+          </a:fillRef>
+          <a:effectRef idx="0">
+            <a:schemeClr val="accent1"/>
+          </a:effectRef>
+          <a:fontRef idx="minor">
+            <a:schemeClr val="lt1"/>
+          </a:fontRef>
+        </p:style>
+        <p:txBody>
+          <a:bodyPr rtlCol="0" anchor="ctr"/>
+          <a:lstStyle/>
+          <a:p>
+            <a:pPr algn="ctr"/>
+            <a:endParaRPr lang="ko-KR" altLang="en-US"/>
+          </a:p>
+        </p:txBody>
+      </p:sp>
+      <p:sp>
+        <p:nvSpPr>
+          <p:cNvPr id="9" name="직사각형 8">
+            <a:extLst>
+              <a:ext uri="{FF2B5EF4-FFF2-40B4-BE49-F238E27FC236}">
+                <a16:creationId xmlns:a16="http://schemas.microsoft.com/office/drawing/2014/main" id="{EE424289-689F-44E3-B0D8-A01DC1979A98}"/>
+              </a:ext>
+            </a:extLst>
+          </p:cNvPr>
+          <p:cNvSpPr/>
+          <p:nvPr/>
+        </p:nvSpPr>
+        <p:spPr>
+          <a:xfrm>
+            <a:off x="2749175" y="3042368"/>
+            <a:ext cx="180242" cy="248641"/>
+          </a:xfrm>
+          <a:prstGeom prst="rect">
+            <a:avLst/>
+          </a:prstGeom>
+          <a:noFill/>
+          <a:ln>
+            <a:solidFill>
+              <a:srgbClr val="FF0000"/>
+            </a:solidFill>
+          </a:ln>
+        </p:spPr>
+        <p:style>
+          <a:lnRef idx="2">
+            <a:schemeClr val="accent1">
+              <a:shade val="50000"/>
+            </a:schemeClr>
+          </a:lnRef>
+          <a:fillRef idx="1">
+            <a:schemeClr val="accent1"/>
+          </a:fillRef>
+          <a:effectRef idx="0">
+            <a:schemeClr val="accent1"/>
+          </a:effectRef>
+          <a:fontRef idx="minor">
+            <a:schemeClr val="lt1"/>
+          </a:fontRef>
+        </p:style>
+        <p:txBody>
+          <a:bodyPr rtlCol="0" anchor="ctr"/>
+          <a:lstStyle/>
+          <a:p>
+            <a:pPr algn="ctr"/>
+            <a:endParaRPr lang="ko-KR" altLang="en-US"/>
+          </a:p>
+        </p:txBody>
+      </p:sp>
+      <p:sp>
+        <p:nvSpPr>
+          <p:cNvPr id="10" name="TextBox 9">
+            <a:extLst>
+              <a:ext uri="{FF2B5EF4-FFF2-40B4-BE49-F238E27FC236}">
+                <a16:creationId xmlns:a16="http://schemas.microsoft.com/office/drawing/2014/main" id="{1C052B8E-11C5-4108-A5CD-D11E276BC29A}"/>
+              </a:ext>
+            </a:extLst>
+          </p:cNvPr>
+          <p:cNvSpPr txBox="1"/>
+          <p:nvPr/>
+        </p:nvSpPr>
+        <p:spPr>
+          <a:xfrm>
+            <a:off x="1599826" y="1999024"/>
+            <a:ext cx="575799" cy="369332"/>
+          </a:xfrm>
+          <a:prstGeom prst="rect">
+            <a:avLst/>
+          </a:prstGeom>
+          <a:noFill/>
+        </p:spPr>
+        <p:txBody>
+          <a:bodyPr wrap="none" rtlCol="0">
+            <a:spAutoFit/>
+          </a:bodyPr>
+          <a:lstStyle/>
+          <a:p>
+            <a:r>
+              <a:rPr lang="en-US" altLang="ko-KR" dirty="0"/>
+              <a:t>TR0</a:t>
+            </a:r>
+            <a:endParaRPr lang="ko-KR" altLang="en-US" dirty="0"/>
+          </a:p>
+        </p:txBody>
+      </p:sp>
+      <p:cxnSp>
+        <p:nvCxnSpPr>
+          <p:cNvPr id="12" name="직선 화살표 연결선 11">
+            <a:extLst>
+              <a:ext uri="{FF2B5EF4-FFF2-40B4-BE49-F238E27FC236}">
+                <a16:creationId xmlns:a16="http://schemas.microsoft.com/office/drawing/2014/main" id="{9265AD96-72D4-4B82-BDD5-9F7DDD384D56}"/>
+              </a:ext>
+            </a:extLst>
+          </p:cNvPr>
+          <p:cNvCxnSpPr>
+            <a:stCxn id="10" idx="2"/>
+            <a:endCxn id="8" idx="0"/>
+          </p:cNvCxnSpPr>
+          <p:nvPr/>
+        </p:nvCxnSpPr>
+        <p:spPr>
+          <a:xfrm>
+            <a:off x="1887726" y="2368356"/>
+            <a:ext cx="0" cy="265950"/>
+          </a:xfrm>
+          <a:prstGeom prst="straightConnector1">
+            <a:avLst/>
+          </a:prstGeom>
+          <a:ln>
+            <a:tailEnd type="triangle"/>
+          </a:ln>
+        </p:spPr>
+        <p:style>
+          <a:lnRef idx="1">
+            <a:schemeClr val="accent1"/>
+          </a:lnRef>
+          <a:fillRef idx="0">
+            <a:schemeClr val="accent1"/>
+          </a:fillRef>
+          <a:effectRef idx="0">
+            <a:schemeClr val="accent1"/>
+          </a:effectRef>
+          <a:fontRef idx="minor">
+            <a:schemeClr val="tx1"/>
+          </a:fontRef>
+        </p:style>
+      </p:cxnSp>
+      <p:sp>
+        <p:nvSpPr>
+          <p:cNvPr id="13" name="TextBox 12">
+            <a:extLst>
+              <a:ext uri="{FF2B5EF4-FFF2-40B4-BE49-F238E27FC236}">
+                <a16:creationId xmlns:a16="http://schemas.microsoft.com/office/drawing/2014/main" id="{1A4E0B86-D16A-41B5-B320-05DD93F77F81}"/>
+              </a:ext>
+            </a:extLst>
+          </p:cNvPr>
+          <p:cNvSpPr txBox="1"/>
+          <p:nvPr/>
+        </p:nvSpPr>
+        <p:spPr>
+          <a:xfrm>
+            <a:off x="2550025" y="1999024"/>
+            <a:ext cx="575799" cy="369332"/>
+          </a:xfrm>
+          <a:prstGeom prst="rect">
+            <a:avLst/>
+          </a:prstGeom>
+          <a:noFill/>
+        </p:spPr>
+        <p:txBody>
+          <a:bodyPr wrap="none" rtlCol="0">
+            <a:spAutoFit/>
+          </a:bodyPr>
+          <a:lstStyle/>
+          <a:p>
+            <a:r>
+              <a:rPr lang="en-US" altLang="ko-KR" dirty="0">
+                <a:solidFill>
+                  <a:srgbClr val="FF0000"/>
+                </a:solidFill>
+              </a:rPr>
+              <a:t>TR0</a:t>
+            </a:r>
+            <a:endParaRPr lang="ko-KR" altLang="en-US" dirty="0">
+              <a:solidFill>
+                <a:srgbClr val="FF0000"/>
+              </a:solidFill>
+            </a:endParaRPr>
+          </a:p>
+        </p:txBody>
+      </p:sp>
+      <p:cxnSp>
+        <p:nvCxnSpPr>
+          <p:cNvPr id="14" name="직선 화살표 연결선 13">
+            <a:extLst>
+              <a:ext uri="{FF2B5EF4-FFF2-40B4-BE49-F238E27FC236}">
+                <a16:creationId xmlns:a16="http://schemas.microsoft.com/office/drawing/2014/main" id="{BF4CEA8D-6EB5-4557-AA6F-6388BCF260EC}"/>
+              </a:ext>
+            </a:extLst>
+          </p:cNvPr>
+          <p:cNvCxnSpPr>
+            <a:cxnSpLocks/>
+            <a:stCxn id="13" idx="2"/>
+            <a:endCxn id="9" idx="0"/>
+          </p:cNvCxnSpPr>
+          <p:nvPr/>
+        </p:nvCxnSpPr>
+        <p:spPr>
+          <a:xfrm>
+            <a:off x="2837925" y="2368356"/>
+            <a:ext cx="1371" cy="674012"/>
+          </a:xfrm>
+          <a:prstGeom prst="straightConnector1">
+            <a:avLst/>
+          </a:prstGeom>
+          <a:ln>
+            <a:tailEnd type="triangle"/>
+          </a:ln>
+        </p:spPr>
+        <p:style>
+          <a:lnRef idx="1">
+            <a:schemeClr val="accent1"/>
+          </a:lnRef>
+          <a:fillRef idx="0">
+            <a:schemeClr val="accent1"/>
+          </a:fillRef>
+          <a:effectRef idx="0">
+            <a:schemeClr val="accent1"/>
+          </a:effectRef>
+          <a:fontRef idx="minor">
+            <a:schemeClr val="tx1"/>
+          </a:fontRef>
+        </p:style>
+      </p:cxnSp>
+      <p:sp>
+        <p:nvSpPr>
+          <p:cNvPr id="16" name="TextBox 15">
+            <a:extLst>
+              <a:ext uri="{FF2B5EF4-FFF2-40B4-BE49-F238E27FC236}">
+                <a16:creationId xmlns:a16="http://schemas.microsoft.com/office/drawing/2014/main" id="{743E5BBF-0250-4BF0-8924-AE1D372C91AB}"/>
+              </a:ext>
+            </a:extLst>
+          </p:cNvPr>
+          <p:cNvSpPr txBox="1"/>
+          <p:nvPr/>
+        </p:nvSpPr>
+        <p:spPr>
+          <a:xfrm>
+            <a:off x="880491" y="3858430"/>
+            <a:ext cx="6410729" cy="246221"/>
+          </a:xfrm>
+          <a:prstGeom prst="rect">
+            <a:avLst/>
+          </a:prstGeom>
+          <a:noFill/>
+        </p:spPr>
+        <p:txBody>
+          <a:bodyPr wrap="none" rtlCol="0">
+            <a:spAutoFit/>
+          </a:bodyPr>
+          <a:lstStyle/>
+          <a:p>
+            <a:r>
+              <a:rPr lang="en-US" altLang="ko-KR" sz="1000" dirty="0"/>
+              <a:t>TR1 </a:t>
+            </a:r>
+            <a:r>
+              <a:rPr lang="ko-KR" altLang="en-US" sz="1000" dirty="0"/>
+              <a:t>이 맞으나</a:t>
+            </a:r>
+            <a:r>
+              <a:rPr lang="en-US" altLang="ko-KR" sz="1000" dirty="0"/>
+              <a:t>, TR0 </a:t>
+            </a:r>
+            <a:r>
+              <a:rPr lang="ko-KR" altLang="en-US" sz="1000" dirty="0"/>
+              <a:t>를 모두 소진해서 </a:t>
+            </a:r>
+            <a:r>
+              <a:rPr lang="en-US" altLang="ko-KR" sz="1000" dirty="0"/>
+              <a:t>TR0 </a:t>
+            </a:r>
+            <a:r>
+              <a:rPr lang="ko-KR" altLang="en-US" sz="1000" dirty="0"/>
+              <a:t>를 더 이상 사용할 필요가 없는 상황에서는 </a:t>
+            </a:r>
+            <a:r>
+              <a:rPr lang="en-US" altLang="ko-KR" sz="1000" dirty="0"/>
+              <a:t>TR0 </a:t>
+            </a:r>
+            <a:r>
+              <a:rPr lang="ko-KR" altLang="en-US" sz="1000" dirty="0"/>
+              <a:t>를 재사용하는 듯</a:t>
+            </a:r>
+            <a:r>
+              <a:rPr lang="en-US" altLang="ko-KR" sz="1000" dirty="0"/>
+              <a:t>.</a:t>
+            </a:r>
+            <a:endParaRPr lang="ko-KR" altLang="en-US" sz="1000" dirty="0"/>
+          </a:p>
+        </p:txBody>
+      </p:sp>
+      <p:sp>
+        <p:nvSpPr>
+          <p:cNvPr id="3" name="TextBox 2">
+            <a:extLst>
+              <a:ext uri="{FF2B5EF4-FFF2-40B4-BE49-F238E27FC236}">
+                <a16:creationId xmlns:a16="http://schemas.microsoft.com/office/drawing/2014/main" id="{FAE88213-95D9-4891-9DA7-DF3881B4B836}"/>
+              </a:ext>
+            </a:extLst>
+          </p:cNvPr>
+          <p:cNvSpPr txBox="1"/>
+          <p:nvPr/>
+        </p:nvSpPr>
+        <p:spPr>
+          <a:xfrm>
+            <a:off x="8516488" y="4339526"/>
+            <a:ext cx="950901" cy="2554545"/>
+          </a:xfrm>
+          <a:prstGeom prst="rect">
+            <a:avLst/>
+          </a:prstGeom>
+          <a:noFill/>
+        </p:spPr>
+        <p:txBody>
+          <a:bodyPr wrap="none" rtlCol="0">
+            <a:spAutoFit/>
+          </a:bodyPr>
+          <a:lstStyle/>
+          <a:p>
+            <a:r>
+              <a:rPr lang="en-US" altLang="ko-KR" sz="1000" dirty="0"/>
+              <a:t>LD P00000</a:t>
+            </a:r>
+          </a:p>
+          <a:p>
+            <a:r>
+              <a:rPr lang="en-US" altLang="ko-KR" sz="1000" b="1" dirty="0"/>
+              <a:t>OUT TR0</a:t>
+            </a:r>
+          </a:p>
+          <a:p>
+            <a:r>
+              <a:rPr lang="en-US" altLang="ko-KR" sz="1000" dirty="0"/>
+              <a:t>AND P00001</a:t>
+            </a:r>
+          </a:p>
+          <a:p>
+            <a:r>
+              <a:rPr lang="en-US" altLang="ko-KR" sz="1000" dirty="0"/>
+              <a:t>OUT P00100</a:t>
+            </a:r>
+          </a:p>
+          <a:p>
+            <a:r>
+              <a:rPr lang="en-US" altLang="ko-KR" sz="1000" dirty="0"/>
+              <a:t>LD TR0</a:t>
+            </a:r>
+          </a:p>
+          <a:p>
+            <a:r>
+              <a:rPr lang="en-US" altLang="ko-KR" sz="1000" dirty="0"/>
+              <a:t>AND P0000B</a:t>
+            </a:r>
+          </a:p>
+          <a:p>
+            <a:r>
+              <a:rPr lang="en-US" altLang="ko-KR" sz="1000" b="1" dirty="0"/>
+              <a:t>OUT TR1</a:t>
+            </a:r>
+          </a:p>
+          <a:p>
+            <a:r>
+              <a:rPr lang="en-US" altLang="ko-KR" sz="1000" dirty="0"/>
+              <a:t>AND P0000C</a:t>
+            </a:r>
+          </a:p>
+          <a:p>
+            <a:r>
+              <a:rPr lang="en-US" altLang="ko-KR" sz="1000" dirty="0"/>
+              <a:t>OUT P00105</a:t>
+            </a:r>
+          </a:p>
+          <a:p>
+            <a:r>
+              <a:rPr lang="en-US" altLang="ko-KR" sz="1000" dirty="0"/>
+              <a:t>LD TR1</a:t>
+            </a:r>
+          </a:p>
+          <a:p>
+            <a:r>
+              <a:rPr lang="en-US" altLang="ko-KR" sz="1000" dirty="0"/>
+              <a:t>AND P0000D</a:t>
+            </a:r>
+          </a:p>
+          <a:p>
+            <a:r>
+              <a:rPr lang="en-US" altLang="ko-KR" sz="1000" dirty="0"/>
+              <a:t>OUT P00106</a:t>
+            </a:r>
+          </a:p>
+          <a:p>
+            <a:r>
+              <a:rPr lang="en-US" altLang="ko-KR" sz="1000" dirty="0"/>
+              <a:t>LD TR0</a:t>
+            </a:r>
+          </a:p>
+          <a:p>
+            <a:r>
+              <a:rPr lang="en-US" altLang="ko-KR" sz="1000" dirty="0"/>
+              <a:t>AND P0000E</a:t>
+            </a:r>
+          </a:p>
+          <a:p>
+            <a:r>
+              <a:rPr lang="en-US" altLang="ko-KR" sz="1000" dirty="0"/>
+              <a:t>OUT P00107</a:t>
+            </a:r>
+          </a:p>
+          <a:p>
+            <a:endParaRPr lang="ko-KR" altLang="en-US" sz="1000" dirty="0"/>
+          </a:p>
+        </p:txBody>
+      </p:sp>
+      <p:pic>
+        <p:nvPicPr>
+          <p:cNvPr id="4" name="그림 3">
+            <a:extLst>
+              <a:ext uri="{FF2B5EF4-FFF2-40B4-BE49-F238E27FC236}">
+                <a16:creationId xmlns:a16="http://schemas.microsoft.com/office/drawing/2014/main" id="{EE7B81EA-038A-4F8E-8009-AC166F6FD654}"/>
+              </a:ext>
+            </a:extLst>
+          </p:cNvPr>
+          <p:cNvPicPr>
+            <a:picLocks noChangeAspect="1"/>
+          </p:cNvPicPr>
+          <p:nvPr/>
+        </p:nvPicPr>
+        <p:blipFill>
+          <a:blip r:embed="rId3"/>
+          <a:stretch>
+            <a:fillRect/>
+          </a:stretch>
+        </p:blipFill>
+        <p:spPr>
+          <a:xfrm>
+            <a:off x="800421" y="4779357"/>
+            <a:ext cx="6905625" cy="1603765"/>
+          </a:xfrm>
+          <a:prstGeom prst="rect">
+            <a:avLst/>
+          </a:prstGeom>
+        </p:spPr>
+      </p:pic>
+      <p:sp>
+        <p:nvSpPr>
+          <p:cNvPr id="18" name="직사각형 17">
+            <a:extLst>
+              <a:ext uri="{FF2B5EF4-FFF2-40B4-BE49-F238E27FC236}">
+                <a16:creationId xmlns:a16="http://schemas.microsoft.com/office/drawing/2014/main" id="{9CAB65EE-CCF6-4DE5-A1B1-1778E577A064}"/>
+              </a:ext>
+            </a:extLst>
+          </p:cNvPr>
+          <p:cNvSpPr/>
+          <p:nvPr/>
+        </p:nvSpPr>
+        <p:spPr>
+          <a:xfrm>
+            <a:off x="1748527" y="4918098"/>
+            <a:ext cx="180242" cy="248641"/>
+          </a:xfrm>
+          <a:prstGeom prst="rect">
+            <a:avLst/>
+          </a:prstGeom>
+          <a:noFill/>
+          <a:ln>
+            <a:solidFill>
+              <a:srgbClr val="FF0000"/>
+            </a:solidFill>
+          </a:ln>
+        </p:spPr>
+        <p:style>
+          <a:lnRef idx="2">
+            <a:schemeClr val="accent1">
+              <a:shade val="50000"/>
+            </a:schemeClr>
+          </a:lnRef>
+          <a:fillRef idx="1">
+            <a:schemeClr val="accent1"/>
+          </a:fillRef>
+          <a:effectRef idx="0">
+            <a:schemeClr val="accent1"/>
+          </a:effectRef>
+          <a:fontRef idx="minor">
+            <a:schemeClr val="lt1"/>
+          </a:fontRef>
+        </p:style>
+        <p:txBody>
+          <a:bodyPr rtlCol="0" anchor="ctr"/>
+          <a:lstStyle/>
+          <a:p>
+            <a:pPr algn="ctr"/>
+            <a:endParaRPr lang="ko-KR" altLang="en-US"/>
+          </a:p>
+        </p:txBody>
+      </p:sp>
+      <p:sp>
+        <p:nvSpPr>
+          <p:cNvPr id="19" name="직사각형 18">
+            <a:extLst>
+              <a:ext uri="{FF2B5EF4-FFF2-40B4-BE49-F238E27FC236}">
+                <a16:creationId xmlns:a16="http://schemas.microsoft.com/office/drawing/2014/main" id="{450CF2E4-0E27-4487-A853-0D67F4F3E8EE}"/>
+              </a:ext>
+            </a:extLst>
+          </p:cNvPr>
+          <p:cNvSpPr/>
+          <p:nvPr/>
+        </p:nvSpPr>
+        <p:spPr>
+          <a:xfrm>
+            <a:off x="2700097" y="5326160"/>
+            <a:ext cx="180242" cy="248641"/>
+          </a:xfrm>
+          <a:prstGeom prst="rect">
+            <a:avLst/>
+          </a:prstGeom>
+          <a:noFill/>
+          <a:ln>
+            <a:solidFill>
+              <a:srgbClr val="FF0000"/>
+            </a:solidFill>
+          </a:ln>
+        </p:spPr>
+        <p:style>
+          <a:lnRef idx="2">
+            <a:schemeClr val="accent1">
+              <a:shade val="50000"/>
+            </a:schemeClr>
+          </a:lnRef>
+          <a:fillRef idx="1">
+            <a:schemeClr val="accent1"/>
+          </a:fillRef>
+          <a:effectRef idx="0">
+            <a:schemeClr val="accent1"/>
+          </a:effectRef>
+          <a:fontRef idx="minor">
+            <a:schemeClr val="lt1"/>
+          </a:fontRef>
+        </p:style>
+        <p:txBody>
+          <a:bodyPr rtlCol="0" anchor="ctr"/>
+          <a:lstStyle/>
+          <a:p>
+            <a:pPr algn="ctr"/>
+            <a:endParaRPr lang="ko-KR" altLang="en-US"/>
+          </a:p>
+        </p:txBody>
+      </p:sp>
+      <p:sp>
+        <p:nvSpPr>
+          <p:cNvPr id="20" name="TextBox 19">
+            <a:extLst>
+              <a:ext uri="{FF2B5EF4-FFF2-40B4-BE49-F238E27FC236}">
+                <a16:creationId xmlns:a16="http://schemas.microsoft.com/office/drawing/2014/main" id="{8F5EE88C-CEC3-41AB-ABD3-6CEF9ED307A2}"/>
+              </a:ext>
+            </a:extLst>
+          </p:cNvPr>
+          <p:cNvSpPr txBox="1"/>
+          <p:nvPr/>
+        </p:nvSpPr>
+        <p:spPr>
+          <a:xfrm>
+            <a:off x="1550748" y="4282816"/>
+            <a:ext cx="575799" cy="369332"/>
+          </a:xfrm>
+          <a:prstGeom prst="rect">
+            <a:avLst/>
+          </a:prstGeom>
+          <a:noFill/>
+        </p:spPr>
+        <p:txBody>
+          <a:bodyPr wrap="none" rtlCol="0">
+            <a:spAutoFit/>
+          </a:bodyPr>
+          <a:lstStyle/>
+          <a:p>
+            <a:r>
+              <a:rPr lang="en-US" altLang="ko-KR" dirty="0"/>
+              <a:t>TR0</a:t>
+            </a:r>
+            <a:endParaRPr lang="ko-KR" altLang="en-US" dirty="0"/>
+          </a:p>
+        </p:txBody>
+      </p:sp>
+      <p:cxnSp>
+        <p:nvCxnSpPr>
+          <p:cNvPr id="21" name="직선 화살표 연결선 20">
+            <a:extLst>
+              <a:ext uri="{FF2B5EF4-FFF2-40B4-BE49-F238E27FC236}">
+                <a16:creationId xmlns:a16="http://schemas.microsoft.com/office/drawing/2014/main" id="{70E68E0F-5C29-4854-A2A1-778C6A46CA78}"/>
+              </a:ext>
+            </a:extLst>
+          </p:cNvPr>
+          <p:cNvCxnSpPr>
+            <a:stCxn id="20" idx="2"/>
+            <a:endCxn id="18" idx="0"/>
+          </p:cNvCxnSpPr>
+          <p:nvPr/>
+        </p:nvCxnSpPr>
+        <p:spPr>
+          <a:xfrm>
+            <a:off x="1838648" y="4652148"/>
+            <a:ext cx="0" cy="265950"/>
+          </a:xfrm>
+          <a:prstGeom prst="straightConnector1">
+            <a:avLst/>
+          </a:prstGeom>
+          <a:ln>
+            <a:tailEnd type="triangle"/>
+          </a:ln>
+        </p:spPr>
+        <p:style>
+          <a:lnRef idx="1">
+            <a:schemeClr val="accent1"/>
+          </a:lnRef>
+          <a:fillRef idx="0">
+            <a:schemeClr val="accent1"/>
+          </a:fillRef>
+          <a:effectRef idx="0">
+            <a:schemeClr val="accent1"/>
+          </a:effectRef>
+          <a:fontRef idx="minor">
+            <a:schemeClr val="tx1"/>
+          </a:fontRef>
+        </p:style>
+      </p:cxnSp>
+      <p:sp>
+        <p:nvSpPr>
+          <p:cNvPr id="22" name="TextBox 21">
+            <a:extLst>
+              <a:ext uri="{FF2B5EF4-FFF2-40B4-BE49-F238E27FC236}">
+                <a16:creationId xmlns:a16="http://schemas.microsoft.com/office/drawing/2014/main" id="{5D7B7BC3-1AD3-43E9-9461-EA868A77F8EF}"/>
+              </a:ext>
+            </a:extLst>
+          </p:cNvPr>
+          <p:cNvSpPr txBox="1"/>
+          <p:nvPr/>
+        </p:nvSpPr>
+        <p:spPr>
+          <a:xfrm>
+            <a:off x="2500947" y="4282816"/>
+            <a:ext cx="575799" cy="369332"/>
+          </a:xfrm>
+          <a:prstGeom prst="rect">
+            <a:avLst/>
+          </a:prstGeom>
+          <a:noFill/>
+        </p:spPr>
+        <p:txBody>
+          <a:bodyPr wrap="none" rtlCol="0">
+            <a:spAutoFit/>
+          </a:bodyPr>
+          <a:lstStyle/>
+          <a:p>
+            <a:r>
+              <a:rPr lang="en-US" altLang="ko-KR" dirty="0"/>
+              <a:t>TR1</a:t>
+            </a:r>
+            <a:endParaRPr lang="ko-KR" altLang="en-US" dirty="0"/>
+          </a:p>
+        </p:txBody>
+      </p:sp>
+      <p:cxnSp>
+        <p:nvCxnSpPr>
+          <p:cNvPr id="23" name="직선 화살표 연결선 22">
+            <a:extLst>
+              <a:ext uri="{FF2B5EF4-FFF2-40B4-BE49-F238E27FC236}">
+                <a16:creationId xmlns:a16="http://schemas.microsoft.com/office/drawing/2014/main" id="{B6117981-F8A6-49E6-B330-AE75F8419FC6}"/>
+              </a:ext>
+            </a:extLst>
+          </p:cNvPr>
+          <p:cNvCxnSpPr>
+            <a:cxnSpLocks/>
+            <a:stCxn id="22" idx="2"/>
+            <a:endCxn id="19" idx="0"/>
+          </p:cNvCxnSpPr>
+          <p:nvPr/>
+        </p:nvCxnSpPr>
+        <p:spPr>
+          <a:xfrm>
+            <a:off x="2788847" y="4652148"/>
+            <a:ext cx="1371" cy="674012"/>
+          </a:xfrm>
+          <a:prstGeom prst="straightConnector1">
+            <a:avLst/>
+          </a:prstGeom>
+          <a:ln>
+            <a:tailEnd type="triangle"/>
+          </a:ln>
+        </p:spPr>
+        <p:style>
+          <a:lnRef idx="1">
+            <a:schemeClr val="accent1"/>
+          </a:lnRef>
+          <a:fillRef idx="0">
+            <a:schemeClr val="accent1"/>
+          </a:fillRef>
+          <a:effectRef idx="0">
+            <a:schemeClr val="accent1"/>
+          </a:effectRef>
+          <a:fontRef idx="minor">
+            <a:schemeClr val="tx1"/>
+          </a:fontRef>
+        </p:style>
+      </p:cxnSp>
+    </p:spTree>
+    <p:extLst>
+      <p:ext uri="{BB962C8B-B14F-4D97-AF65-F5344CB8AC3E}">
+        <p14:creationId xmlns:p14="http://schemas.microsoft.com/office/powerpoint/2010/main" val="3001976135"/>
       </p:ext>
     </p:extLst>
   </p:cSld>

</xml_diff>